<commit_message>
updated presentation with screen shots
</commit_message>
<xml_diff>
--- a/Group_Project_1__Movie_Actor_Finder.pptx
+++ b/Group_Project_1__Movie_Actor_Finder.pptx
@@ -5,7 +5,7 @@
     <p:sldMasterId id="2147483659" r:id="rId1"/>
   </p:sldMasterIdLst>
   <p:notesMasterIdLst>
-    <p:notesMasterId r:id="rId9"/>
+    <p:notesMasterId r:id="rId11"/>
   </p:notesMasterIdLst>
   <p:sldIdLst>
     <p:sldId id="256" r:id="rId2"/>
@@ -13,8 +13,10 @@
     <p:sldId id="258" r:id="rId4"/>
     <p:sldId id="259" r:id="rId5"/>
     <p:sldId id="260" r:id="rId6"/>
-    <p:sldId id="261" r:id="rId7"/>
-    <p:sldId id="262" r:id="rId8"/>
+    <p:sldId id="263" r:id="rId7"/>
+    <p:sldId id="264" r:id="rId8"/>
+    <p:sldId id="261" r:id="rId9"/>
+    <p:sldId id="262" r:id="rId10"/>
   </p:sldIdLst>
   <p:sldSz cx="9144000" cy="5143500" type="screen16x9"/>
   <p:notesSz cx="6858000" cy="9144000"/>
@@ -1221,6 +1223,224 @@
   <p:cSld>
     <p:spTree>
       <p:nvGrpSpPr>
+        <p:cNvPr id="1" name="Shape 73"/>
+        <p:cNvGrpSpPr/>
+        <p:nvPr/>
+      </p:nvGrpSpPr>
+      <p:grpSpPr>
+        <a:xfrm>
+          <a:off x="0" y="0"/>
+          <a:ext cx="0" cy="0"/>
+          <a:chOff x="0" y="0"/>
+          <a:chExt cx="0" cy="0"/>
+        </a:xfrm>
+      </p:grpSpPr>
+      <p:sp>
+        <p:nvSpPr>
+          <p:cNvPr id="74" name="Google Shape;74;g29f43f0a72_0_15:notes"/>
+          <p:cNvSpPr>
+            <a:spLocks noGrp="1" noRot="1" noChangeAspect="1"/>
+          </p:cNvSpPr>
+          <p:nvPr>
+            <p:ph type="sldImg" idx="2"/>
+          </p:nvPr>
+        </p:nvSpPr>
+        <p:spPr>
+          <a:xfrm>
+            <a:off x="381000" y="685800"/>
+            <a:ext cx="6096000" cy="3429000"/>
+          </a:xfrm>
+          <a:custGeom>
+            <a:avLst/>
+            <a:gdLst/>
+            <a:ahLst/>
+            <a:cxnLst/>
+            <a:rect l="l" t="t" r="r" b="b"/>
+            <a:pathLst>
+              <a:path w="120000" h="120000" extrusionOk="0">
+                <a:moveTo>
+                  <a:pt x="0" y="0"/>
+                </a:moveTo>
+                <a:lnTo>
+                  <a:pt x="120000" y="0"/>
+                </a:lnTo>
+                <a:lnTo>
+                  <a:pt x="120000" y="120000"/>
+                </a:lnTo>
+                <a:lnTo>
+                  <a:pt x="0" y="120000"/>
+                </a:lnTo>
+                <a:close/>
+              </a:path>
+            </a:pathLst>
+          </a:custGeom>
+        </p:spPr>
+      </p:sp>
+      <p:sp>
+        <p:nvSpPr>
+          <p:cNvPr id="75" name="Google Shape;75;g29f43f0a72_0_15:notes"/>
+          <p:cNvSpPr txBox="1">
+            <a:spLocks noGrp="1"/>
+          </p:cNvSpPr>
+          <p:nvPr>
+            <p:ph type="body" idx="1"/>
+          </p:nvPr>
+        </p:nvSpPr>
+        <p:spPr>
+          <a:xfrm>
+            <a:off x="685800" y="4343400"/>
+            <a:ext cx="5486400" cy="4114800"/>
+          </a:xfrm>
+          <a:prstGeom prst="rect">
+            <a:avLst/>
+          </a:prstGeom>
+        </p:spPr>
+        <p:txBody>
+          <a:bodyPr spcFirstLastPara="1" wrap="square" lIns="91425" tIns="91425" rIns="91425" bIns="91425" anchor="t" anchorCtr="0">
+            <a:noAutofit/>
+          </a:bodyPr>
+          <a:lstStyle/>
+          <a:p>
+            <a:pPr marL="0" lvl="0" indent="0" algn="l" rtl="0">
+              <a:spcBef>
+                <a:spcPts val="0"/>
+              </a:spcBef>
+              <a:spcAft>
+                <a:spcPts val="0"/>
+              </a:spcAft>
+              <a:buNone/>
+            </a:pPr>
+            <a:endParaRPr/>
+          </a:p>
+        </p:txBody>
+      </p:sp>
+    </p:spTree>
+    <p:extLst>
+      <p:ext uri="{BB962C8B-B14F-4D97-AF65-F5344CB8AC3E}">
+        <p14:creationId xmlns:p14="http://schemas.microsoft.com/office/powerpoint/2010/main" val="2487372090"/>
+      </p:ext>
+    </p:extLst>
+  </p:cSld>
+  <p:clrMapOvr>
+    <a:masterClrMapping/>
+  </p:clrMapOvr>
+</p:notes>
+</file>
+
+<file path=ppt/notesSlides/notesSlide7.xml><?xml version="1.0" encoding="utf-8"?>
+<p:notes xmlns:a="http://schemas.openxmlformats.org/drawingml/2006/main" xmlns:r="http://schemas.openxmlformats.org/officeDocument/2006/relationships" xmlns:p="http://schemas.openxmlformats.org/presentationml/2006/main" showMasterSp="0" showMasterPhAnim="0">
+  <p:cSld>
+    <p:spTree>
+      <p:nvGrpSpPr>
+        <p:cNvPr id="1" name="Shape 73"/>
+        <p:cNvGrpSpPr/>
+        <p:nvPr/>
+      </p:nvGrpSpPr>
+      <p:grpSpPr>
+        <a:xfrm>
+          <a:off x="0" y="0"/>
+          <a:ext cx="0" cy="0"/>
+          <a:chOff x="0" y="0"/>
+          <a:chExt cx="0" cy="0"/>
+        </a:xfrm>
+      </p:grpSpPr>
+      <p:sp>
+        <p:nvSpPr>
+          <p:cNvPr id="74" name="Google Shape;74;g29f43f0a72_0_15:notes"/>
+          <p:cNvSpPr>
+            <a:spLocks noGrp="1" noRot="1" noChangeAspect="1"/>
+          </p:cNvSpPr>
+          <p:nvPr>
+            <p:ph type="sldImg" idx="2"/>
+          </p:nvPr>
+        </p:nvSpPr>
+        <p:spPr>
+          <a:xfrm>
+            <a:off x="381000" y="685800"/>
+            <a:ext cx="6096000" cy="3429000"/>
+          </a:xfrm>
+          <a:custGeom>
+            <a:avLst/>
+            <a:gdLst/>
+            <a:ahLst/>
+            <a:cxnLst/>
+            <a:rect l="l" t="t" r="r" b="b"/>
+            <a:pathLst>
+              <a:path w="120000" h="120000" extrusionOk="0">
+                <a:moveTo>
+                  <a:pt x="0" y="0"/>
+                </a:moveTo>
+                <a:lnTo>
+                  <a:pt x="120000" y="0"/>
+                </a:lnTo>
+                <a:lnTo>
+                  <a:pt x="120000" y="120000"/>
+                </a:lnTo>
+                <a:lnTo>
+                  <a:pt x="0" y="120000"/>
+                </a:lnTo>
+                <a:close/>
+              </a:path>
+            </a:pathLst>
+          </a:custGeom>
+        </p:spPr>
+      </p:sp>
+      <p:sp>
+        <p:nvSpPr>
+          <p:cNvPr id="75" name="Google Shape;75;g29f43f0a72_0_15:notes"/>
+          <p:cNvSpPr txBox="1">
+            <a:spLocks noGrp="1"/>
+          </p:cNvSpPr>
+          <p:nvPr>
+            <p:ph type="body" idx="1"/>
+          </p:nvPr>
+        </p:nvSpPr>
+        <p:spPr>
+          <a:xfrm>
+            <a:off x="685800" y="4343400"/>
+            <a:ext cx="5486400" cy="4114800"/>
+          </a:xfrm>
+          <a:prstGeom prst="rect">
+            <a:avLst/>
+          </a:prstGeom>
+        </p:spPr>
+        <p:txBody>
+          <a:bodyPr spcFirstLastPara="1" wrap="square" lIns="91425" tIns="91425" rIns="91425" bIns="91425" anchor="t" anchorCtr="0">
+            <a:noAutofit/>
+          </a:bodyPr>
+          <a:lstStyle/>
+          <a:p>
+            <a:pPr marL="0" lvl="0" indent="0" algn="l" rtl="0">
+              <a:spcBef>
+                <a:spcPts val="0"/>
+              </a:spcBef>
+              <a:spcAft>
+                <a:spcPts val="0"/>
+              </a:spcAft>
+              <a:buNone/>
+            </a:pPr>
+            <a:endParaRPr/>
+          </a:p>
+        </p:txBody>
+      </p:sp>
+    </p:spTree>
+    <p:extLst>
+      <p:ext uri="{BB962C8B-B14F-4D97-AF65-F5344CB8AC3E}">
+        <p14:creationId xmlns:p14="http://schemas.microsoft.com/office/powerpoint/2010/main" val="3020221834"/>
+      </p:ext>
+    </p:extLst>
+  </p:cSld>
+  <p:clrMapOvr>
+    <a:masterClrMapping/>
+  </p:clrMapOvr>
+</p:notes>
+</file>
+
+<file path=ppt/notesSlides/notesSlide8.xml><?xml version="1.0" encoding="utf-8"?>
+<p:notes xmlns:a="http://schemas.openxmlformats.org/drawingml/2006/main" xmlns:r="http://schemas.openxmlformats.org/officeDocument/2006/relationships" xmlns:p="http://schemas.openxmlformats.org/presentationml/2006/main" showMasterSp="0" showMasterPhAnim="0">
+  <p:cSld>
+    <p:spTree>
+      <p:nvGrpSpPr>
         <p:cNvPr id="1" name="Shape 78"/>
         <p:cNvGrpSpPr/>
         <p:nvPr/>
@@ -1320,7 +1540,7 @@
 </p:notes>
 </file>
 
-<file path=ppt/notesSlides/notesSlide7.xml><?xml version="1.0" encoding="utf-8"?>
+<file path=ppt/notesSlides/notesSlide9.xml><?xml version="1.0" encoding="utf-8"?>
 <p:notes xmlns:a="http://schemas.openxmlformats.org/drawingml/2006/main" xmlns:r="http://schemas.openxmlformats.org/officeDocument/2006/relationships" xmlns:p="http://schemas.openxmlformats.org/presentationml/2006/main" showMasterSp="0" showMasterPhAnim="0">
   <p:cSld>
     <p:spTree>
@@ -6740,7 +6960,7 @@
             </a:pPr>
             <a:r>
               <a:rPr lang="en" sz="1100" dirty="0"/>
-              <a:t>Sam – responsible for page formatting</a:t>
+              <a:t>Sam – responsible for page formatting, utilized Bulma, setup initial page and background</a:t>
             </a:r>
           </a:p>
           <a:p>
@@ -6753,7 +6973,7 @@
             </a:pPr>
             <a:r>
               <a:rPr lang="en" sz="1100" dirty="0"/>
-              <a:t>Taylor – responsible for search bar code, callable modal, when scrapped due to API problems, helped complete JS code to present data from APIs, helped with initial page structure</a:t>
+              <a:t>Taylor – responsible for search bar code, callable modal, when scrapped due to API problems, helped complete JS code to present data from APIs, helped merged code from feature branches</a:t>
             </a:r>
           </a:p>
           <a:p>
@@ -6766,7 +6986,7 @@
             </a:pPr>
             <a:r>
               <a:rPr lang="en" sz="1100" dirty="0"/>
-              <a:t>Brad – responsible for APIs and PowerPoint presentation</a:t>
+              <a:t>Brad – responsible for APIs and PowerPoint presentation, helped merge code from feature branches</a:t>
             </a:r>
           </a:p>
           <a:p>
@@ -6779,7 +6999,7 @@
             </a:pPr>
             <a:r>
               <a:rPr lang="en" sz="1100" dirty="0"/>
-              <a:t>Joey – responsible for initial page structure</a:t>
+              <a:t>Joey – responsible for initial page structure and modal</a:t>
             </a:r>
           </a:p>
           <a:p>
@@ -6920,6 +7140,126 @@
   <p:cSld>
     <p:spTree>
       <p:nvGrpSpPr>
+        <p:cNvPr id="1" name="Shape 76"/>
+        <p:cNvGrpSpPr/>
+        <p:nvPr/>
+      </p:nvGrpSpPr>
+      <p:grpSpPr>
+        <a:xfrm>
+          <a:off x="0" y="0"/>
+          <a:ext cx="0" cy="0"/>
+          <a:chOff x="0" y="0"/>
+          <a:chExt cx="0" cy="0"/>
+        </a:xfrm>
+      </p:grpSpPr>
+      <p:pic>
+        <p:nvPicPr>
+          <p:cNvPr id="9" name="Picture 8" descr="A picture containing text, monitor, screenshot&#10;&#10;Description automatically generated">
+            <a:extLst>
+              <a:ext uri="{FF2B5EF4-FFF2-40B4-BE49-F238E27FC236}">
+                <a16:creationId xmlns:a16="http://schemas.microsoft.com/office/drawing/2014/main" id="{7DEEF6A5-63B1-458C-867D-4B0F3E144272}"/>
+              </a:ext>
+            </a:extLst>
+          </p:cNvPr>
+          <p:cNvPicPr>
+            <a:picLocks noChangeAspect="1"/>
+          </p:cNvPicPr>
+          <p:nvPr/>
+        </p:nvPicPr>
+        <p:blipFill>
+          <a:blip r:embed="rId3"/>
+          <a:stretch>
+            <a:fillRect/>
+          </a:stretch>
+        </p:blipFill>
+        <p:spPr>
+          <a:xfrm>
+            <a:off x="0" y="741013"/>
+            <a:ext cx="9144000" cy="3661474"/>
+          </a:xfrm>
+          <a:prstGeom prst="rect">
+            <a:avLst/>
+          </a:prstGeom>
+        </p:spPr>
+      </p:pic>
+    </p:spTree>
+    <p:extLst>
+      <p:ext uri="{BB962C8B-B14F-4D97-AF65-F5344CB8AC3E}">
+        <p14:creationId xmlns:p14="http://schemas.microsoft.com/office/powerpoint/2010/main" val="628250318"/>
+      </p:ext>
+    </p:extLst>
+  </p:cSld>
+  <p:clrMapOvr>
+    <a:masterClrMapping/>
+  </p:clrMapOvr>
+</p:sld>
+</file>
+
+<file path=ppt/slides/slide7.xml><?xml version="1.0" encoding="utf-8"?>
+<p:sld xmlns:a="http://schemas.openxmlformats.org/drawingml/2006/main" xmlns:r="http://schemas.openxmlformats.org/officeDocument/2006/relationships" xmlns:p="http://schemas.openxmlformats.org/presentationml/2006/main">
+  <p:cSld>
+    <p:spTree>
+      <p:nvGrpSpPr>
+        <p:cNvPr id="1" name="Shape 76"/>
+        <p:cNvGrpSpPr/>
+        <p:nvPr/>
+      </p:nvGrpSpPr>
+      <p:grpSpPr>
+        <a:xfrm>
+          <a:off x="0" y="0"/>
+          <a:ext cx="0" cy="0"/>
+          <a:chOff x="0" y="0"/>
+          <a:chExt cx="0" cy="0"/>
+        </a:xfrm>
+      </p:grpSpPr>
+      <p:pic>
+        <p:nvPicPr>
+          <p:cNvPr id="5" name="Picture 4" descr="Graphical user interface, website&#10;&#10;Description automatically generated">
+            <a:extLst>
+              <a:ext uri="{FF2B5EF4-FFF2-40B4-BE49-F238E27FC236}">
+                <a16:creationId xmlns:a16="http://schemas.microsoft.com/office/drawing/2014/main" id="{9ECB8AEB-51EC-492B-A625-73BF12B6852D}"/>
+              </a:ext>
+            </a:extLst>
+          </p:cNvPr>
+          <p:cNvPicPr>
+            <a:picLocks noChangeAspect="1"/>
+          </p:cNvPicPr>
+          <p:nvPr/>
+        </p:nvPicPr>
+        <p:blipFill>
+          <a:blip r:embed="rId3"/>
+          <a:stretch>
+            <a:fillRect/>
+          </a:stretch>
+        </p:blipFill>
+        <p:spPr>
+          <a:xfrm>
+            <a:off x="0" y="734269"/>
+            <a:ext cx="9144000" cy="3674962"/>
+          </a:xfrm>
+          <a:prstGeom prst="rect">
+            <a:avLst/>
+          </a:prstGeom>
+        </p:spPr>
+      </p:pic>
+    </p:spTree>
+    <p:extLst>
+      <p:ext uri="{BB962C8B-B14F-4D97-AF65-F5344CB8AC3E}">
+        <p14:creationId xmlns:p14="http://schemas.microsoft.com/office/powerpoint/2010/main" val="2093025799"/>
+      </p:ext>
+    </p:extLst>
+  </p:cSld>
+  <p:clrMapOvr>
+    <a:masterClrMapping/>
+  </p:clrMapOvr>
+</p:sld>
+</file>
+
+<file path=ppt/slides/slide8.xml><?xml version="1.0" encoding="utf-8"?>
+<p:sld xmlns:a="http://schemas.openxmlformats.org/drawingml/2006/main" xmlns:r="http://schemas.openxmlformats.org/officeDocument/2006/relationships" xmlns:p="http://schemas.openxmlformats.org/presentationml/2006/main">
+  <p:cSld>
+    <p:spTree>
+      <p:nvGrpSpPr>
         <p:cNvPr id="1" name="Shape 81"/>
         <p:cNvGrpSpPr/>
         <p:nvPr/>
@@ -7011,7 +7351,7 @@
             </a:pPr>
             <a:r>
               <a:rPr lang="en-US" dirty="0"/>
-              <a:t>We would like to be able to make the movie venues clickable to get more information about each venue</a:t>
+              <a:t>We would like to only show one venue if duplicates are provided by the API</a:t>
             </a:r>
           </a:p>
           <a:p>
@@ -7072,7 +7412,7 @@
 </p:sld>
 </file>
 
-<file path=ppt/slides/slide7.xml><?xml version="1.0" encoding="utf-8"?>
+<file path=ppt/slides/slide9.xml><?xml version="1.0" encoding="utf-8"?>
 <p:sld xmlns:a="http://schemas.openxmlformats.org/drawingml/2006/main" xmlns:r="http://schemas.openxmlformats.org/officeDocument/2006/relationships" xmlns:p="http://schemas.openxmlformats.org/presentationml/2006/main">
   <p:cSld>
     <p:spTree>

</xml_diff>

<commit_message>
updated presentation description of Sams contribution to include the search bar
</commit_message>
<xml_diff>
--- a/Group_Project_1__Movie_Actor_Finder.pptx
+++ b/Group_Project_1__Movie_Actor_Finder.pptx
@@ -6960,7 +6960,15 @@
             </a:pPr>
             <a:r>
               <a:rPr lang="en" sz="1100" dirty="0"/>
-              <a:t>Sam – responsible for page formatting, utilized Bulma, setup initial page and background</a:t>
+              <a:t>Sam – responsible for page formatting, utilized Bulma, setup </a:t>
+            </a:r>
+            <a:r>
+              <a:rPr lang="en" sz="1100"/>
+              <a:t>initial page, search bar </a:t>
+            </a:r>
+            <a:r>
+              <a:rPr lang="en" sz="1100" dirty="0"/>
+              <a:t>and background</a:t>
             </a:r>
           </a:p>
           <a:p>

</xml_diff>